<commit_message>
Multiple fixes to solve 'zoomies', vehicle shape flexibility, other stability improvements.
</commit_message>
<xml_diff>
--- a/images/KnowledgeDomain.pptx
+++ b/images/KnowledgeDomain.pptx
@@ -261,7 +261,7 @@
           <a:p>
             <a:fld id="{BD78DA1D-D039-A64E-950E-B22CCF7BC5A5}" type="datetimeFigureOut">
               <a:rPr lang="en-US" smtClean="0"/>
-              <a:t>10/27/2023</a:t>
+              <a:t>2/26/2024</a:t>
             </a:fld>
             <a:endParaRPr lang="en-US"/>
           </a:p>
@@ -459,7 +459,7 @@
           <a:p>
             <a:fld id="{BD78DA1D-D039-A64E-950E-B22CCF7BC5A5}" type="datetimeFigureOut">
               <a:rPr lang="en-US" smtClean="0"/>
-              <a:t>10/27/2023</a:t>
+              <a:t>2/26/2024</a:t>
             </a:fld>
             <a:endParaRPr lang="en-US"/>
           </a:p>
@@ -667,7 +667,7 @@
           <a:p>
             <a:fld id="{BD78DA1D-D039-A64E-950E-B22CCF7BC5A5}" type="datetimeFigureOut">
               <a:rPr lang="en-US" smtClean="0"/>
-              <a:t>10/27/2023</a:t>
+              <a:t>2/26/2024</a:t>
             </a:fld>
             <a:endParaRPr lang="en-US"/>
           </a:p>
@@ -865,7 +865,7 @@
           <a:p>
             <a:fld id="{BD78DA1D-D039-A64E-950E-B22CCF7BC5A5}" type="datetimeFigureOut">
               <a:rPr lang="en-US" smtClean="0"/>
-              <a:t>10/27/2023</a:t>
+              <a:t>2/26/2024</a:t>
             </a:fld>
             <a:endParaRPr lang="en-US"/>
           </a:p>
@@ -1140,7 +1140,7 @@
           <a:p>
             <a:fld id="{BD78DA1D-D039-A64E-950E-B22CCF7BC5A5}" type="datetimeFigureOut">
               <a:rPr lang="en-US" smtClean="0"/>
-              <a:t>10/27/2023</a:t>
+              <a:t>2/26/2024</a:t>
             </a:fld>
             <a:endParaRPr lang="en-US"/>
           </a:p>
@@ -1405,7 +1405,7 @@
           <a:p>
             <a:fld id="{BD78DA1D-D039-A64E-950E-B22CCF7BC5A5}" type="datetimeFigureOut">
               <a:rPr lang="en-US" smtClean="0"/>
-              <a:t>10/27/2023</a:t>
+              <a:t>2/26/2024</a:t>
             </a:fld>
             <a:endParaRPr lang="en-US"/>
           </a:p>
@@ -1817,7 +1817,7 @@
           <a:p>
             <a:fld id="{BD78DA1D-D039-A64E-950E-B22CCF7BC5A5}" type="datetimeFigureOut">
               <a:rPr lang="en-US" smtClean="0"/>
-              <a:t>10/27/2023</a:t>
+              <a:t>2/26/2024</a:t>
             </a:fld>
             <a:endParaRPr lang="en-US"/>
           </a:p>
@@ -1958,7 +1958,7 @@
           <a:p>
             <a:fld id="{BD78DA1D-D039-A64E-950E-B22CCF7BC5A5}" type="datetimeFigureOut">
               <a:rPr lang="en-US" smtClean="0"/>
-              <a:t>10/27/2023</a:t>
+              <a:t>2/26/2024</a:t>
             </a:fld>
             <a:endParaRPr lang="en-US"/>
           </a:p>
@@ -2071,7 +2071,7 @@
           <a:p>
             <a:fld id="{BD78DA1D-D039-A64E-950E-B22CCF7BC5A5}" type="datetimeFigureOut">
               <a:rPr lang="en-US" smtClean="0"/>
-              <a:t>10/27/2023</a:t>
+              <a:t>2/26/2024</a:t>
             </a:fld>
             <a:endParaRPr lang="en-US"/>
           </a:p>
@@ -2382,7 +2382,7 @@
           <a:p>
             <a:fld id="{BD78DA1D-D039-A64E-950E-B22CCF7BC5A5}" type="datetimeFigureOut">
               <a:rPr lang="en-US" smtClean="0"/>
-              <a:t>10/27/2023</a:t>
+              <a:t>2/26/2024</a:t>
             </a:fld>
             <a:endParaRPr lang="en-US"/>
           </a:p>
@@ -2670,7 +2670,7 @@
           <a:p>
             <a:fld id="{BD78DA1D-D039-A64E-950E-B22CCF7BC5A5}" type="datetimeFigureOut">
               <a:rPr lang="en-US" smtClean="0"/>
-              <a:t>10/27/2023</a:t>
+              <a:t>2/26/2024</a:t>
             </a:fld>
             <a:endParaRPr lang="en-US"/>
           </a:p>
@@ -2911,7 +2911,7 @@
           <a:p>
             <a:fld id="{BD78DA1D-D039-A64E-950E-B22CCF7BC5A5}" type="datetimeFigureOut">
               <a:rPr lang="en-US" smtClean="0"/>
-              <a:t>10/27/2023</a:t>
+              <a:t>2/26/2024</a:t>
             </a:fld>
             <a:endParaRPr lang="en-US"/>
           </a:p>
@@ -7467,7 +7467,13 @@
               <a:rPr lang="en-US" sz="1600" b="1" dirty="0" err="1"/>
               <a:t>SimplePriority</a:t>
             </a:r>
-            <a:endParaRPr lang="en-US" sz="1600" b="1" dirty="0"/>
+            <a:br>
+              <a:rPr lang="en-US" sz="1600" b="1" dirty="0"/>
+            </a:br>
+            <a:r>
+              <a:rPr lang="en-US" sz="1600" b="1" dirty="0"/>
+              <a:t>(0.5,0.5)</a:t>
+            </a:r>
           </a:p>
         </p:txBody>
       </p:sp>
@@ -8049,7 +8055,7 @@
             </a:br>
             <a:r>
               <a:rPr lang="en-US" sz="1600" b="1" dirty="0"/>
-              <a:t>(0.2,0.1,0.1,0.1)</a:t>
+              <a:t>(0.2,0.1,0.15,0.05)</a:t>
             </a:r>
           </a:p>
         </p:txBody>
@@ -8294,12 +8300,12 @@
         </p:nvCxnSpPr>
         <p:spPr>
           <a:xfrm rot="16200000" flipH="1">
-            <a:off x="7957598" y="1985953"/>
-            <a:ext cx="726598" cy="753161"/>
+            <a:off x="7945105" y="1998447"/>
+            <a:ext cx="726598" cy="728174"/>
           </a:xfrm>
           <a:prstGeom prst="bentConnector3">
             <a:avLst>
-              <a:gd name="adj1" fmla="val 47239"/>
+              <a:gd name="adj1" fmla="val 47294"/>
             </a:avLst>
           </a:prstGeom>
           <a:ln w="28575">
@@ -9053,8 +9059,8 @@
           </p:nvSpPr>
           <p:spPr>
             <a:xfrm>
-              <a:off x="7784774" y="2725833"/>
-              <a:ext cx="1825408" cy="528100"/>
+              <a:off x="7647122" y="2725833"/>
+              <a:ext cx="2050737" cy="528100"/>
             </a:xfrm>
             <a:prstGeom prst="rect">
               <a:avLst/>
@@ -9084,12 +9090,8 @@
             <a:p>
               <a:pPr algn="ctr"/>
               <a:r>
-                <a:rPr lang="en-US" sz="1600" b="1"/>
-                <a:t>(0.3,0.2,0.1,0.1,0.1</a:t>
-              </a:r>
-              <a:r>
                 <a:rPr lang="en-US" sz="1600" b="1" dirty="0"/>
-                <a:t>)</a:t>
+                <a:t>(0.3,0.2,0.1,0.15,0.05)</a:t>
               </a:r>
             </a:p>
           </p:txBody>
@@ -9104,6 +9106,7 @@
               </a:extLst>
             </p:cNvPr>
             <p:cNvCxnSpPr>
+              <a:cxnSpLocks/>
               <a:stCxn id="108" idx="2"/>
               <a:endCxn id="102" idx="0"/>
             </p:cNvCxnSpPr>
@@ -9111,8 +9114,8 @@
           </p:nvCxnSpPr>
           <p:spPr>
             <a:xfrm rot="5400000">
-              <a:off x="7354909" y="2565022"/>
-              <a:ext cx="653659" cy="2031481"/>
+              <a:off x="7342415" y="2577515"/>
+              <a:ext cx="653659" cy="2006494"/>
             </a:xfrm>
             <a:prstGeom prst="bentConnector3">
               <a:avLst/>
@@ -9156,12 +9159,12 @@
           </p:nvCxnSpPr>
           <p:spPr>
             <a:xfrm rot="16200000" flipH="1">
-              <a:off x="8443252" y="3508159"/>
-              <a:ext cx="2831804" cy="2323352"/>
+              <a:off x="8430758" y="3495665"/>
+              <a:ext cx="2831804" cy="2348339"/>
             </a:xfrm>
             <a:prstGeom prst="bentConnector3">
               <a:avLst>
-                <a:gd name="adj1" fmla="val 11464"/>
+                <a:gd name="adj1" fmla="val 11460"/>
               </a:avLst>
             </a:prstGeom>
             <a:ln w="28575">
@@ -9406,6 +9409,96 @@
           </p:txBody>
         </p:sp>
       </p:grpSp>
+      <p:cxnSp>
+        <p:nvCxnSpPr>
+          <p:cNvPr id="9" name="Straight Arrow Connector 8">
+            <a:extLst>
+              <a:ext uri="{FF2B5EF4-FFF2-40B4-BE49-F238E27FC236}">
+                <a16:creationId xmlns:a16="http://schemas.microsoft.com/office/drawing/2014/main" id="{0CC8EA7F-B5C3-BCAA-CFFA-D90E421FE2E4}"/>
+              </a:ext>
+            </a:extLst>
+          </p:cNvPr>
+          <p:cNvCxnSpPr>
+            <a:cxnSpLocks/>
+          </p:cNvCxnSpPr>
+          <p:nvPr/>
+        </p:nvCxnSpPr>
+        <p:spPr>
+          <a:xfrm flipV="1">
+            <a:off x="2994836" y="4913077"/>
+            <a:ext cx="4036777" cy="15657"/>
+          </a:xfrm>
+          <a:prstGeom prst="straightConnector1">
+            <a:avLst/>
+          </a:prstGeom>
+          <a:ln w="50800">
+            <a:solidFill>
+              <a:schemeClr val="accent4"/>
+            </a:solidFill>
+            <a:headEnd type="stealth" w="lg" len="lg"/>
+            <a:tailEnd type="stealth" w="lg" len="lg"/>
+          </a:ln>
+        </p:spPr>
+        <p:style>
+          <a:lnRef idx="1">
+            <a:schemeClr val="accent1"/>
+          </a:lnRef>
+          <a:fillRef idx="0">
+            <a:schemeClr val="accent1"/>
+          </a:fillRef>
+          <a:effectRef idx="0">
+            <a:schemeClr val="accent1"/>
+          </a:effectRef>
+          <a:fontRef idx="minor">
+            <a:schemeClr val="tx1"/>
+          </a:fontRef>
+        </p:style>
+      </p:cxnSp>
+      <p:cxnSp>
+        <p:nvCxnSpPr>
+          <p:cNvPr id="17" name="Straight Arrow Connector 16">
+            <a:extLst>
+              <a:ext uri="{FF2B5EF4-FFF2-40B4-BE49-F238E27FC236}">
+                <a16:creationId xmlns:a16="http://schemas.microsoft.com/office/drawing/2014/main" id="{F5813A08-B4A4-68D5-C149-82902E04E5BB}"/>
+              </a:ext>
+            </a:extLst>
+          </p:cNvPr>
+          <p:cNvCxnSpPr>
+            <a:cxnSpLocks/>
+          </p:cNvCxnSpPr>
+          <p:nvPr/>
+        </p:nvCxnSpPr>
+        <p:spPr>
+          <a:xfrm flipV="1">
+            <a:off x="6782545" y="5491187"/>
+            <a:ext cx="1414897" cy="689180"/>
+          </a:xfrm>
+          <a:prstGeom prst="straightConnector1">
+            <a:avLst/>
+          </a:prstGeom>
+          <a:ln w="50800">
+            <a:solidFill>
+              <a:schemeClr val="accent4"/>
+            </a:solidFill>
+            <a:headEnd type="none" w="lg" len="lg"/>
+            <a:tailEnd type="stealth" w="lg" len="lg"/>
+          </a:ln>
+        </p:spPr>
+        <p:style>
+          <a:lnRef idx="1">
+            <a:schemeClr val="accent1"/>
+          </a:lnRef>
+          <a:fillRef idx="0">
+            <a:schemeClr val="accent1"/>
+          </a:fillRef>
+          <a:effectRef idx="0">
+            <a:schemeClr val="accent1"/>
+          </a:effectRef>
+          <a:fontRef idx="minor">
+            <a:schemeClr val="tx1"/>
+          </a:fontRef>
+        </p:style>
+      </p:cxnSp>
     </p:spTree>
     <p:extLst>
       <p:ext uri="{BB962C8B-B14F-4D97-AF65-F5344CB8AC3E}">

</xml_diff>